<commit_message>
modified lesson 3 pshe corrected calculations
modified lesson 3 pshe corrected calculations
</commit_message>
<xml_diff>
--- a/15finance/pics/income tax questions answers.pptx
+++ b/15finance/pics/income tax questions answers.pptx
@@ -194,7 +194,8 @@
           <a:p>
             <a:fld id="{2523A1A7-6062-430A-9F9F-D212616DB853}" type="datetimeFigureOut">
               <a:rPr lang="en-GB" smtClean="0"/>
-              <a:t>26/11/2016</a:t>
+              <a:pPr/>
+              <a:t>27/11/2016</a:t>
             </a:fld>
             <a:endParaRPr lang="en-GB"/>
           </a:p>
@@ -355,6 +356,7 @@
           <a:p>
             <a:fld id="{E9551066-F942-4B94-B8F4-F4A9410C875A}" type="slidenum">
               <a:rPr lang="en-GB" smtClean="0"/>
+              <a:pPr/>
               <a:t>‹#›</a:t>
             </a:fld>
             <a:endParaRPr lang="en-GB"/>
@@ -918,7 +920,7 @@
             <a:fld id="{1D8BD707-D9CF-40AE-B4C6-C98DA3205C09}" type="datetimeFigureOut">
               <a:rPr lang="en-US" smtClean="0"/>
               <a:pPr/>
-              <a:t>11/26/2016</a:t>
+              <a:t>11/27/2016</a:t>
             </a:fld>
             <a:endParaRPr lang="en-US"/>
           </a:p>
@@ -1233,7 +1235,7 @@
             <a:fld id="{1D8BD707-D9CF-40AE-B4C6-C98DA3205C09}" type="datetimeFigureOut">
               <a:rPr lang="en-US" smtClean="0"/>
               <a:pPr/>
-              <a:t>11/26/2016</a:t>
+              <a:t>11/27/2016</a:t>
             </a:fld>
             <a:endParaRPr lang="en-US"/>
           </a:p>
@@ -1420,7 +1422,7 @@
             <a:fld id="{1D8BD707-D9CF-40AE-B4C6-C98DA3205C09}" type="datetimeFigureOut">
               <a:rPr lang="en-US" smtClean="0"/>
               <a:pPr/>
-              <a:t>11/26/2016</a:t>
+              <a:t>11/27/2016</a:t>
             </a:fld>
             <a:endParaRPr lang="en-US"/>
           </a:p>
@@ -1597,7 +1599,7 @@
             <a:fld id="{1D8BD707-D9CF-40AE-B4C6-C98DA3205C09}" type="datetimeFigureOut">
               <a:rPr lang="en-US" smtClean="0"/>
               <a:pPr/>
-              <a:t>11/26/2016</a:t>
+              <a:t>11/27/2016</a:t>
             </a:fld>
             <a:endParaRPr lang="en-US"/>
           </a:p>
@@ -1867,7 +1869,7 @@
             <a:fld id="{1D8BD707-D9CF-40AE-B4C6-C98DA3205C09}" type="datetimeFigureOut">
               <a:rPr lang="en-US" smtClean="0"/>
               <a:pPr/>
-              <a:t>11/26/2016</a:t>
+              <a:t>11/27/2016</a:t>
             </a:fld>
             <a:endParaRPr lang="en-US"/>
           </a:p>
@@ -2337,7 +2339,7 @@
             <a:fld id="{1D8BD707-D9CF-40AE-B4C6-C98DA3205C09}" type="datetimeFigureOut">
               <a:rPr lang="en-US" smtClean="0"/>
               <a:pPr/>
-              <a:t>11/26/2016</a:t>
+              <a:t>11/27/2016</a:t>
             </a:fld>
             <a:endParaRPr lang="en-US"/>
           </a:p>
@@ -2828,7 +2830,7 @@
             <a:fld id="{1D8BD707-D9CF-40AE-B4C6-C98DA3205C09}" type="datetimeFigureOut">
               <a:rPr lang="en-US" smtClean="0"/>
               <a:pPr/>
-              <a:t>11/26/2016</a:t>
+              <a:t>11/27/2016</a:t>
             </a:fld>
             <a:endParaRPr lang="en-US"/>
           </a:p>
@@ -2956,7 +2958,7 @@
             <a:fld id="{1D8BD707-D9CF-40AE-B4C6-C98DA3205C09}" type="datetimeFigureOut">
               <a:rPr lang="en-US" smtClean="0"/>
               <a:pPr/>
-              <a:t>11/26/2016</a:t>
+              <a:t>11/27/2016</a:t>
             </a:fld>
             <a:endParaRPr lang="en-US"/>
           </a:p>
@@ -3102,7 +3104,7 @@
             <a:fld id="{1D8BD707-D9CF-40AE-B4C6-C98DA3205C09}" type="datetimeFigureOut">
               <a:rPr lang="en-US" smtClean="0"/>
               <a:pPr/>
-              <a:t>11/26/2016</a:t>
+              <a:t>11/27/2016</a:t>
             </a:fld>
             <a:endParaRPr lang="en-US"/>
           </a:p>
@@ -3426,7 +3428,7 @@
             <a:fld id="{1D8BD707-D9CF-40AE-B4C6-C98DA3205C09}" type="datetimeFigureOut">
               <a:rPr lang="en-US" smtClean="0"/>
               <a:pPr/>
-              <a:t>11/26/2016</a:t>
+              <a:t>11/27/2016</a:t>
             </a:fld>
             <a:endParaRPr lang="en-US"/>
           </a:p>
@@ -3562,7 +3564,7 @@
             <a:fld id="{1D8BD707-D9CF-40AE-B4C6-C98DA3205C09}" type="datetimeFigureOut">
               <a:rPr lang="en-US" smtClean="0"/>
               <a:pPr/>
-              <a:t>11/26/2016</a:t>
+              <a:t>11/27/2016</a:t>
             </a:fld>
             <a:endParaRPr lang="en-US"/>
           </a:p>
@@ -4345,7 +4347,7 @@
             <a:fld id="{1D8BD707-D9CF-40AE-B4C6-C98DA3205C09}" type="datetimeFigureOut">
               <a:rPr lang="en-US" smtClean="0"/>
               <a:pPr/>
-              <a:t>11/26/2016</a:t>
+              <a:t>11/27/2016</a:t>
             </a:fld>
             <a:endParaRPr lang="en-US"/>
           </a:p>
@@ -5031,7 +5033,7 @@
           <a:p>
             <a:pPr eaLnBrk="1" hangingPunct="1"/>
             <a:r>
-              <a:rPr lang="en-US" altLang="en-US" sz="4000" b="1" smtClean="0"/>
+              <a:rPr lang="en-US" altLang="en-US" sz="4000" b="1" dirty="0" smtClean="0"/>
               <a:t>Answers:  6-10</a:t>
             </a:r>
           </a:p>
@@ -5065,23 +5067,33 @@
             <a:pPr eaLnBrk="1" hangingPunct="1"/>
             <a:r>
               <a:rPr lang="en-US" altLang="en-US" sz="2800" dirty="0" smtClean="0"/>
-              <a:t>6  </a:t>
-            </a:r>
-            <a:r>
-              <a:rPr lang="en-US" altLang="en-US" sz="2800" dirty="0" err="1" smtClean="0"/>
-              <a:t>Anamaria</a:t>
+              <a:t>6  F</a:t>
             </a:r>
             <a:r>
               <a:rPr lang="en-US" altLang="en-US" sz="2800" dirty="0" smtClean="0"/>
-              <a:t>: £2,320</a:t>
-            </a:r>
+              <a:t>red</a:t>
+            </a:r>
+            <a:r>
+              <a:rPr lang="en-US" altLang="en-US" sz="2800" dirty="0" smtClean="0"/>
+              <a:t> £2,920</a:t>
+            </a:r>
+            <a:endParaRPr lang="en-US" altLang="en-US" sz="2800" dirty="0" smtClean="0"/>
           </a:p>
           <a:p>
             <a:pPr eaLnBrk="1" hangingPunct="1"/>
             <a:r>
               <a:rPr lang="en-US" altLang="en-US" sz="2800" dirty="0" smtClean="0"/>
-              <a:t>7  Phyllis: £4,152</a:t>
-            </a:r>
+              <a:t>7  </a:t>
+            </a:r>
+            <a:r>
+              <a:rPr lang="en-US" altLang="en-US" sz="2800" dirty="0" smtClean="0"/>
+              <a:t>Alice</a:t>
+            </a:r>
+            <a:r>
+              <a:rPr lang="en-US" altLang="en-US" sz="2800" dirty="0" smtClean="0"/>
+              <a:t>: £4,852</a:t>
+            </a:r>
+            <a:endParaRPr lang="en-US" altLang="en-US" sz="2800" dirty="0" smtClean="0"/>
           </a:p>
           <a:p>
             <a:pPr eaLnBrk="1" hangingPunct="1"/>
@@ -5090,13 +5102,14 @@
               <a:t>8  </a:t>
             </a:r>
             <a:r>
-              <a:rPr lang="en-US" altLang="en-US" sz="2800" dirty="0" err="1" smtClean="0"/>
-              <a:t>Rocko</a:t>
-            </a:r>
-            <a:r>
               <a:rPr lang="en-US" altLang="en-US" sz="2800" dirty="0" smtClean="0"/>
-              <a:t>: £4,551</a:t>
-            </a:r>
+              <a:t>Eric</a:t>
+            </a:r>
+            <a:r>
+              <a:rPr lang="en-US" altLang="en-US" sz="2800" dirty="0" smtClean="0"/>
+              <a:t>: £5,500</a:t>
+            </a:r>
+            <a:endParaRPr lang="en-US" altLang="en-US" sz="2800" dirty="0" smtClean="0"/>
           </a:p>
           <a:p>
             <a:pPr eaLnBrk="1" hangingPunct="1"/>
@@ -5105,13 +5118,14 @@
               <a:t>9  </a:t>
             </a:r>
             <a:r>
-              <a:rPr lang="en-US" altLang="en-US" sz="2800" dirty="0" err="1" smtClean="0"/>
-              <a:t>Daiyu</a:t>
-            </a:r>
-            <a:r>
               <a:rPr lang="en-US" altLang="en-US" sz="2800" dirty="0" smtClean="0"/>
-              <a:t>: £8,000</a:t>
-            </a:r>
+              <a:t>Robert</a:t>
+            </a:r>
+            <a:r>
+              <a:rPr lang="en-US" altLang="en-US" sz="2800" dirty="0" smtClean="0"/>
+              <a:t>: £6,300</a:t>
+            </a:r>
+            <a:endParaRPr lang="en-US" altLang="en-US" sz="2800" dirty="0" smtClean="0"/>
           </a:p>
           <a:p>
             <a:pPr eaLnBrk="1" hangingPunct="1"/>
@@ -5120,35 +5134,34 @@
               <a:t>10 </a:t>
             </a:r>
             <a:r>
-              <a:rPr lang="en-US" altLang="en-US" sz="2800" dirty="0" err="1" smtClean="0"/>
-              <a:t>Maahir</a:t>
-            </a:r>
-            <a:r>
               <a:rPr lang="en-US" altLang="en-US" sz="2800" dirty="0" smtClean="0"/>
-              <a:t>: £15,592</a:t>
-            </a:r>
+              <a:t>Faith</a:t>
+            </a:r>
+            <a:r>
+              <a:rPr lang="en-US" altLang="en-US" sz="2800" dirty="0" smtClean="0"/>
+              <a:t>: £7,344</a:t>
+            </a:r>
+            <a:endParaRPr lang="en-US" altLang="en-US" sz="2800" dirty="0" smtClean="0"/>
           </a:p>
         </p:txBody>
       </p:sp>
       <p:pic>
         <p:nvPicPr>
-          <p:cNvPr id="32772" name="Picture 1"/>
-          <p:cNvPicPr>
-            <a:picLocks noChangeAspect="1"/>
-          </p:cNvPicPr>
+          <p:cNvPr id="5" name="Picture 4"/>
+          <p:cNvPicPr/>
           <p:nvPr/>
         </p:nvPicPr>
         <p:blipFill>
           <a:blip r:embed="rId3" cstate="print"/>
-          <a:srcRect/>
+          <a:srcRect l="12010" t="42992" r="77044" b="20433"/>
           <a:stretch>
             <a:fillRect/>
           </a:stretch>
         </p:blipFill>
         <p:spPr bwMode="auto">
           <a:xfrm>
-            <a:off x="4349354" y="2441575"/>
-            <a:ext cx="3483769" cy="3829050"/>
+            <a:off x="5638800" y="1905000"/>
+            <a:ext cx="2667000" cy="2438400"/>
           </a:xfrm>
           <a:prstGeom prst="rect">
             <a:avLst/>
@@ -5290,7 +5303,7 @@
             <a:pPr eaLnBrk="1" hangingPunct="1"/>
             <a:r>
               <a:rPr lang="en-US" altLang="en-US" sz="2800" dirty="0" smtClean="0"/>
-              <a:t>15 Astrid: £425,299.55</a:t>
+              <a:t>15 Astrid: £425,299</a:t>
             </a:r>
           </a:p>
         </p:txBody>

</xml_diff>